<commit_message>
chore: shifted legend position for heatmap
</commit_message>
<xml_diff>
--- a/Poster-A1.pptx
+++ b/Poster-A1.pptx
@@ -241,7 +241,7 @@
             <a:fld id="{0158C5BC-9A70-462C-B28D-9600239EAC64}" type="datetimeFigureOut">
               <a:rPr lang="en-US" smtClean="0"/>
               <a:pPr/>
-              <a:t>4/19/2025</a:t>
+              <a:t>4/20/2025</a:t>
             </a:fld>
             <a:endParaRPr lang="en-US"/>
           </a:p>
@@ -408,7 +408,7 @@
             <a:fld id="{E6CC2317-6751-4CD4-9995-8782DD78E936}" type="datetimeFigureOut">
               <a:rPr lang="en-US" smtClean="0"/>
               <a:pPr/>
-              <a:t>4/19/2025</a:t>
+              <a:t>4/20/2025</a:t>
             </a:fld>
             <a:endParaRPr lang="en-US" dirty="0"/>
           </a:p>
@@ -6336,8 +6336,8 @@
         </p:blipFill>
         <p:spPr>
           <a:xfrm>
-            <a:off x="-50006" y="20462906"/>
-            <a:ext cx="21488400" cy="9812307"/>
+            <a:off x="-50006" y="7877226"/>
+            <a:ext cx="21488400" cy="22397988"/>
           </a:xfrm>
           <a:prstGeom prst="rect">
             <a:avLst/>
@@ -6374,83 +6374,13 @@
         <p:spPr>
           <a:xfrm>
             <a:off x="-25003" y="-3822240"/>
-            <a:ext cx="21438394" cy="10646839"/>
+            <a:ext cx="21438394" cy="11699466"/>
           </a:xfrm>
           <a:prstGeom prst="rect">
             <a:avLst/>
           </a:prstGeom>
         </p:spPr>
       </p:pic>
-      <p:pic>
-        <p:nvPicPr>
-          <p:cNvPr id="20" name="Picture 19">
-            <a:extLst>
-              <a:ext uri="{FF2B5EF4-FFF2-40B4-BE49-F238E27FC236}">
-                <a16:creationId xmlns:a16="http://schemas.microsoft.com/office/drawing/2014/main" id="{D12E8948-7323-C79B-0641-DB093E2A9D33}"/>
-              </a:ext>
-            </a:extLst>
-          </p:cNvPr>
-          <p:cNvPicPr>
-            <a:picLocks noChangeAspect="1"/>
-          </p:cNvPicPr>
-          <p:nvPr/>
-        </p:nvPicPr>
-        <p:blipFill>
-          <a:blip r:embed="rId6"/>
-          <a:srcRect r="13302" b="13786"/>
-          <a:stretch/>
-        </p:blipFill>
-        <p:spPr>
-          <a:xfrm>
-            <a:off x="10963412" y="20189093"/>
-            <a:ext cx="9999312" cy="9943513"/>
-          </a:xfrm>
-          <a:prstGeom prst="rect">
-            <a:avLst/>
-          </a:prstGeom>
-          <a:ln>
-            <a:solidFill>
-              <a:schemeClr val="bg2">
-                <a:lumMod val="90000"/>
-              </a:schemeClr>
-            </a:solidFill>
-          </a:ln>
-        </p:spPr>
-      </p:pic>
-      <p:sp>
-        <p:nvSpPr>
-          <p:cNvPr id="28" name="Text Placeholder 27">
-            <a:extLst>
-              <a:ext uri="{FF2B5EF4-FFF2-40B4-BE49-F238E27FC236}">
-                <a16:creationId xmlns:a16="http://schemas.microsoft.com/office/drawing/2014/main" id="{3F0F9E90-FAA0-694D-A385-A29160674B09}"/>
-              </a:ext>
-            </a:extLst>
-          </p:cNvPr>
-          <p:cNvSpPr>
-            <a:spLocks noGrp="1"/>
-          </p:cNvSpPr>
-          <p:nvPr>
-            <p:ph type="body" sz="quarter" idx="10"/>
-          </p:nvPr>
-        </p:nvSpPr>
-        <p:spPr>
-          <a:xfrm>
-            <a:off x="453609" y="2649890"/>
-            <a:ext cx="10101856" cy="2474061"/>
-          </a:xfrm>
-        </p:spPr>
-        <p:txBody>
-          <a:bodyPr/>
-          <a:lstStyle/>
-          <a:p>
-            <a:pPr algn="just"/>
-            <a:r>
-              <a:rPr lang="en-US" dirty="0"/>
-              <a:t>This project presents an interactive dashboard that visualizes how major U.S. market indices (S&amp;P 500, Nasdaq-100, Dow Jones) respond to macroeconomic indicators and global events. By combining financial market data with FOMC sentiment analysis and the GDELT global events dataset—an external, event-driven source capturing worldwide media coverage and geopolitical developments—the dashboard provides a multidimensional perspective on market behavior. This integration allows retail investors to explore how news sentiment and real-world events may influence market movements, supporting more informed investment decisions.</a:t>
-            </a:r>
-          </a:p>
-        </p:txBody>
-      </p:sp>
       <p:sp>
         <p:nvSpPr>
           <p:cNvPr id="29" name="Text Placeholder 28">
@@ -6469,46 +6399,13 @@
         </p:nvSpPr>
         <p:spPr>
           <a:xfrm>
-            <a:off x="449463" y="2040731"/>
-            <a:ext cx="10093882" cy="566030"/>
-          </a:xfrm>
-        </p:spPr>
-        <p:txBody>
-          <a:bodyPr/>
-          <a:lstStyle/>
-          <a:p>
-            <a:r>
-              <a:rPr lang="en-US" dirty="0"/>
-              <a:t>OVERVIEW</a:t>
-            </a:r>
-          </a:p>
-        </p:txBody>
-      </p:sp>
-      <p:sp>
-        <p:nvSpPr>
-          <p:cNvPr id="30" name="Text Placeholder 29">
-            <a:extLst>
-              <a:ext uri="{FF2B5EF4-FFF2-40B4-BE49-F238E27FC236}">
-                <a16:creationId xmlns:a16="http://schemas.microsoft.com/office/drawing/2014/main" id="{F756C91F-A769-8746-9736-6A1E2B721D6B}"/>
-              </a:ext>
-            </a:extLst>
-          </p:cNvPr>
-          <p:cNvSpPr>
-            <a:spLocks noGrp="1"/>
-          </p:cNvSpPr>
-          <p:nvPr>
-            <p:ph type="body" sz="quarter" idx="20"/>
-          </p:nvPr>
-        </p:nvSpPr>
-        <p:spPr>
-          <a:xfrm>
-            <a:off x="425664" y="14965284"/>
-            <a:ext cx="10096349" cy="566030"/>
+            <a:off x="426936" y="1922743"/>
+            <a:ext cx="10093882" cy="5840183"/>
           </a:xfrm>
           <a:solidFill>
-            <a:schemeClr val="bg1">
-              <a:alpha val="50000"/>
-            </a:schemeClr>
+            <a:srgbClr val="FFFFFF">
+              <a:alpha val="50196"/>
+            </a:srgbClr>
           </a:solidFill>
         </p:spPr>
         <p:txBody>
@@ -6516,46 +6413,97 @@
           <a:lstStyle/>
           <a:p>
             <a:r>
-              <a:rPr lang="en-US" dirty="0"/>
+              <a:rPr lang="en-US" dirty="0">
+                <a:solidFill>
+                  <a:schemeClr val="tx1"/>
+                </a:solidFill>
+              </a:rPr>
+              <a:t>OVERVIEW</a:t>
+            </a:r>
+          </a:p>
+          <a:p>
+            <a:pPr algn="just"/>
+            <a:r>
+              <a:rPr lang="en-US" sz="2000" b="0" u="none" dirty="0">
+                <a:solidFill>
+                  <a:schemeClr val="tx1"/>
+                </a:solidFill>
+                <a:latin typeface="Times New Roman" panose="02020603050405020304" pitchFamily="18" charset="0"/>
+                <a:cs typeface="Times New Roman" panose="02020603050405020304" pitchFamily="18" charset="0"/>
+              </a:rPr>
+              <a:t>This project presents an interactive dashboard that visualizes how major U.S. market indices (S&amp;P 500, Nasdaq-100, Dow Jones) respond to macroeconomic indicators and global events. By combining financial market data with FOMC sentiment analysis and the GDELT global events dataset—an external, event-driven source capturing worldwide media coverage and geopolitical developments—the dashboard provides a multidimensional perspective on market behavior. This integration allows retail investors to explore how news sentiment and real-world events may influence market movements, supporting more informed investment decisions.</a:t>
+            </a:r>
+          </a:p>
+          <a:p>
+            <a:endParaRPr lang="en-US" dirty="0">
+              <a:solidFill>
+                <a:schemeClr val="tx1"/>
+              </a:solidFill>
+            </a:endParaRPr>
+          </a:p>
+          <a:p>
+            <a:r>
+              <a:rPr lang="en-US" dirty="0">
+                <a:solidFill>
+                  <a:schemeClr val="tx1"/>
+                </a:solidFill>
+              </a:rPr>
               <a:t>OBJECTIVES</a:t>
             </a:r>
+            <a:endParaRPr lang="en-US" sz="2000" b="0" u="none" dirty="0">
+              <a:solidFill>
+                <a:schemeClr val="tx1"/>
+              </a:solidFill>
+              <a:latin typeface="Times New Roman" panose="02020603050405020304" pitchFamily="18" charset="0"/>
+              <a:cs typeface="Times New Roman" panose="02020603050405020304" pitchFamily="18" charset="0"/>
+            </a:endParaRPr>
           </a:p>
-        </p:txBody>
-      </p:sp>
-      <p:sp>
-        <p:nvSpPr>
-          <p:cNvPr id="31" name="Text Placeholder 30">
-            <a:extLst>
-              <a:ext uri="{FF2B5EF4-FFF2-40B4-BE49-F238E27FC236}">
-                <a16:creationId xmlns:a16="http://schemas.microsoft.com/office/drawing/2014/main" id="{4D8E9A6E-E5FF-AB49-84AA-3A4E1523DDE0}"/>
-              </a:ext>
-            </a:extLst>
-          </p:cNvPr>
-          <p:cNvSpPr>
-            <a:spLocks noGrp="1"/>
-          </p:cNvSpPr>
-          <p:nvPr>
-            <p:ph type="body" sz="quarter" idx="25"/>
-          </p:nvPr>
-        </p:nvSpPr>
-        <p:spPr>
-          <a:xfrm>
-            <a:off x="366857" y="25774418"/>
-            <a:ext cx="10093752" cy="566030"/>
-          </a:xfrm>
-          <a:solidFill>
-            <a:schemeClr val="bg1">
-              <a:alpha val="50000"/>
-            </a:schemeClr>
-          </a:solidFill>
-        </p:spPr>
-        <p:txBody>
-          <a:bodyPr/>
-          <a:lstStyle/>
           <a:p>
+            <a:pPr marL="342900" indent="-342900" algn="l">
+              <a:buFont typeface="Arial" panose="020B0604020202020204" pitchFamily="34" charset="0"/>
+              <a:buChar char="•"/>
+            </a:pPr>
             <a:r>
-              <a:rPr lang="en-US" dirty="0"/>
-              <a:t>CONCLUSION</a:t>
+              <a:rPr lang="en-US" sz="2000" b="0" u="none" dirty="0">
+                <a:solidFill>
+                  <a:schemeClr val="tx1"/>
+                </a:solidFill>
+                <a:latin typeface="Times New Roman" panose="02020603050405020304" pitchFamily="18" charset="0"/>
+                <a:cs typeface="Times New Roman" panose="02020603050405020304" pitchFamily="18" charset="0"/>
+              </a:rPr>
+              <a:t>Analyze the correlation between global events (GDELT) and U.S. financial indices using sentiment analysis.</a:t>
+            </a:r>
+          </a:p>
+          <a:p>
+            <a:pPr marL="342900" indent="-342900" algn="l">
+              <a:buFont typeface="Arial" panose="020B0604020202020204" pitchFamily="34" charset="0"/>
+              <a:buChar char="•"/>
+            </a:pPr>
+            <a:r>
+              <a:rPr lang="en-US" sz="2000" b="0" u="none" dirty="0">
+                <a:solidFill>
+                  <a:schemeClr val="tx1"/>
+                </a:solidFill>
+                <a:latin typeface="Times New Roman" panose="02020603050405020304" pitchFamily="18" charset="0"/>
+                <a:cs typeface="Times New Roman" panose="02020603050405020304" pitchFamily="18" charset="0"/>
+              </a:rPr>
+              <a:t>Investigate how FOMC announcements influence investor sentiment and stock market volatility.</a:t>
+            </a:r>
+          </a:p>
+          <a:p>
+            <a:pPr marL="342900" indent="-342900" algn="l">
+              <a:buFont typeface="Arial" panose="020B0604020202020204" pitchFamily="34" charset="0"/>
+              <a:buChar char="•"/>
+            </a:pPr>
+            <a:r>
+              <a:rPr lang="en-US" sz="2000" b="0" u="none" dirty="0">
+                <a:solidFill>
+                  <a:schemeClr val="tx1"/>
+                </a:solidFill>
+                <a:latin typeface="Times New Roman" panose="02020603050405020304" pitchFamily="18" charset="0"/>
+                <a:cs typeface="Times New Roman" panose="02020603050405020304" pitchFamily="18" charset="0"/>
+              </a:rPr>
+              <a:t>Provide an interactive visualization to help retail investors understand market behavior in response to economic events.</a:t>
             </a:r>
           </a:p>
         </p:txBody>
@@ -6578,8 +6526,8 @@
         </p:nvSpPr>
         <p:spPr>
           <a:xfrm>
-            <a:off x="357266" y="26346181"/>
-            <a:ext cx="10093752" cy="3089614"/>
+            <a:off x="444771" y="26307172"/>
+            <a:ext cx="10093752" cy="3582057"/>
           </a:xfrm>
           <a:solidFill>
             <a:schemeClr val="bg1">
@@ -6591,72 +6539,31 @@
           <a:bodyPr/>
           <a:lstStyle/>
           <a:p>
+            <a:pPr algn="ctr"/>
+            <a:r>
+              <a:rPr lang="en-US" sz="2800" b="1" u="sng" dirty="0">
+                <a:solidFill>
+                  <a:schemeClr val="tx1"/>
+                </a:solidFill>
+                <a:latin typeface="+mn-lt"/>
+              </a:rPr>
+              <a:t>CONCLUSION</a:t>
+            </a:r>
+            <a:endParaRPr lang="en-US" dirty="0">
+              <a:solidFill>
+                <a:schemeClr val="tx1"/>
+              </a:solidFill>
+            </a:endParaRPr>
+          </a:p>
+          <a:p>
             <a:pPr algn="just"/>
             <a:r>
-              <a:rPr lang="en-US" dirty="0"/>
+              <a:rPr lang="en-US" dirty="0">
+                <a:solidFill>
+                  <a:schemeClr val="tx1"/>
+                </a:solidFill>
+              </a:rPr>
               <a:t>Analyzing the interactions between U.S. market performance, macroeconomic indicators, and global events reveals crucial patterns for investors. The interactive dashboard highlights how global events, sourced from GDELT, significantly influence market movements, while FOMC sentiment plays a pivotal role in shaping short-term market reactions. Positive FOMC language tends to coincide with market rallies, while more hawkish tones are often linked to increased volatility. Moreover, geopolitical and economic disruptions clearly affect market dynamics, emphasizing the need for real-time monitoring by investors. By visualizing these relationships, the dashboard offers a powerful tool for navigating the complexities of the financial landscape and making data-driven investment decisions.</a:t>
-            </a:r>
-          </a:p>
-        </p:txBody>
-      </p:sp>
-      <p:sp>
-        <p:nvSpPr>
-          <p:cNvPr id="37" name="Text Placeholder 36">
-            <a:extLst>
-              <a:ext uri="{FF2B5EF4-FFF2-40B4-BE49-F238E27FC236}">
-                <a16:creationId xmlns:a16="http://schemas.microsoft.com/office/drawing/2014/main" id="{3B540C16-8ABD-8B40-A51F-D32095A92519}"/>
-              </a:ext>
-            </a:extLst>
-          </p:cNvPr>
-          <p:cNvSpPr>
-            <a:spLocks noGrp="1"/>
-          </p:cNvSpPr>
-          <p:nvPr>
-            <p:ph type="body" sz="quarter" idx="96"/>
-          </p:nvPr>
-        </p:nvSpPr>
-        <p:spPr>
-          <a:xfrm>
-            <a:off x="408261" y="15522971"/>
-            <a:ext cx="10102728" cy="2289395"/>
-          </a:xfrm>
-          <a:solidFill>
-            <a:schemeClr val="bg1">
-              <a:alpha val="50000"/>
-            </a:schemeClr>
-          </a:solidFill>
-        </p:spPr>
-        <p:txBody>
-          <a:bodyPr/>
-          <a:lstStyle/>
-          <a:p>
-            <a:pPr marL="342900" indent="-342900">
-              <a:buFont typeface="Arial" panose="020B0604020202020204" pitchFamily="34" charset="0"/>
-              <a:buChar char="•"/>
-            </a:pPr>
-            <a:r>
-              <a:rPr lang="en-US" dirty="0"/>
-              <a:t>Analyze the correlation between global events (GDELT) and U.S. financial indices using sentiment analysis.</a:t>
-            </a:r>
-          </a:p>
-          <a:p>
-            <a:pPr marL="342900" indent="-342900">
-              <a:buFont typeface="Arial" panose="020B0604020202020204" pitchFamily="34" charset="0"/>
-              <a:buChar char="•"/>
-            </a:pPr>
-            <a:r>
-              <a:rPr lang="en-US" dirty="0"/>
-              <a:t>Investigate how FOMC announcements influence investor sentiment and stock market volatility.</a:t>
-            </a:r>
-          </a:p>
-          <a:p>
-            <a:pPr marL="342900" indent="-342900">
-              <a:buFont typeface="Arial" panose="020B0604020202020204" pitchFamily="34" charset="0"/>
-              <a:buChar char="•"/>
-            </a:pPr>
-            <a:r>
-              <a:rPr lang="en-US" dirty="0"/>
-              <a:t>Provide an interactive visualization to help retail investors understand market behavior in response to economic events.</a:t>
             </a:r>
           </a:p>
         </p:txBody>
@@ -6690,10 +6597,18 @@
           <a:lstStyle/>
           <a:p>
             <a:r>
-              <a:rPr lang="en-GB" dirty="0"/>
+              <a:rPr lang="en-GB" dirty="0">
+                <a:solidFill>
+                  <a:schemeClr val="tx1"/>
+                </a:solidFill>
+              </a:rPr>
               <a:t>Investigating the Influence of Global Events and FOMC Sentiment on U.S. Markets</a:t>
             </a:r>
-            <a:endParaRPr lang="en-US" dirty="0"/>
+            <a:endParaRPr lang="en-US" dirty="0">
+              <a:solidFill>
+                <a:schemeClr val="tx1"/>
+              </a:solidFill>
+            </a:endParaRPr>
           </a:p>
         </p:txBody>
       </p:sp>
@@ -6712,7 +6627,7 @@
           <p:nvPr/>
         </p:nvPicPr>
         <p:blipFill>
-          <a:blip r:embed="rId7"/>
+          <a:blip r:embed="rId6"/>
           <a:stretch>
             <a:fillRect/>
           </a:stretch>
@@ -6727,8 +6642,9 @@
           </a:prstGeom>
           <a:ln>
             <a:solidFill>
-              <a:schemeClr val="bg2">
-                <a:lumMod val="90000"/>
+              <a:schemeClr val="tx1">
+                <a:lumMod val="50000"/>
+                <a:lumOff val="50000"/>
               </a:schemeClr>
             </a:solidFill>
           </a:ln>
@@ -6749,7 +6665,7 @@
           <p:nvPr/>
         </p:nvPicPr>
         <p:blipFill>
-          <a:blip r:embed="rId8"/>
+          <a:blip r:embed="rId7"/>
           <a:stretch>
             <a:fillRect/>
           </a:stretch>
@@ -6764,8 +6680,9 @@
           </a:prstGeom>
           <a:ln>
             <a:solidFill>
-              <a:schemeClr val="bg2">
-                <a:lumMod val="90000"/>
+              <a:schemeClr val="tx1">
+                <a:lumMod val="50000"/>
+                <a:lumOff val="50000"/>
               </a:schemeClr>
             </a:solidFill>
           </a:ln>
@@ -6786,15 +6703,15 @@
           <p:nvPr/>
         </p:nvPicPr>
         <p:blipFill>
-          <a:blip r:embed="rId9"/>
+          <a:blip r:embed="rId8"/>
           <a:stretch>
             <a:fillRect/>
           </a:stretch>
         </p:blipFill>
         <p:spPr>
           <a:xfrm>
-            <a:off x="594822" y="5033730"/>
-            <a:ext cx="9803164" cy="9803164"/>
+            <a:off x="435794" y="7892004"/>
+            <a:ext cx="10093752" cy="10093752"/>
           </a:xfrm>
           <a:prstGeom prst="rect">
             <a:avLst/>
@@ -6802,8 +6719,9 @@
           <a:noFill/>
           <a:ln>
             <a:solidFill>
-              <a:schemeClr val="bg2">
-                <a:lumMod val="90000"/>
+              <a:schemeClr val="tx1">
+                <a:lumMod val="50000"/>
+                <a:lumOff val="50000"/>
               </a:schemeClr>
             </a:solidFill>
           </a:ln>
@@ -6824,6 +6742,44 @@
           <p:nvPr/>
         </p:nvPicPr>
         <p:blipFill>
+          <a:blip r:embed="rId9"/>
+          <a:stretch>
+            <a:fillRect/>
+          </a:stretch>
+        </p:blipFill>
+        <p:spPr>
+          <a:xfrm>
+            <a:off x="451791" y="18112755"/>
+            <a:ext cx="10065055" cy="8052045"/>
+          </a:xfrm>
+          <a:prstGeom prst="rect">
+            <a:avLst/>
+          </a:prstGeom>
+          <a:ln>
+            <a:solidFill>
+              <a:schemeClr val="tx1">
+                <a:lumMod val="50000"/>
+                <a:lumOff val="50000"/>
+              </a:schemeClr>
+            </a:solidFill>
+          </a:ln>
+        </p:spPr>
+      </p:pic>
+      <p:pic>
+        <p:nvPicPr>
+          <p:cNvPr id="3" name="Picture 2">
+            <a:extLst>
+              <a:ext uri="{FF2B5EF4-FFF2-40B4-BE49-F238E27FC236}">
+                <a16:creationId xmlns:a16="http://schemas.microsoft.com/office/drawing/2014/main" id="{2DCC5508-6220-C57F-E5A2-628054C8056F}"/>
+              </a:ext>
+            </a:extLst>
+          </p:cNvPr>
+          <p:cNvPicPr>
+            <a:picLocks noChangeAspect="1"/>
+          </p:cNvPicPr>
+          <p:nvPr/>
+        </p:nvPicPr>
+        <p:blipFill>
           <a:blip r:embed="rId10"/>
           <a:stretch>
             <a:fillRect/>
@@ -6831,16 +6787,17 @@
         </p:blipFill>
         <p:spPr>
           <a:xfrm>
-            <a:off x="594823" y="17825948"/>
-            <a:ext cx="9803164" cy="7842532"/>
+            <a:off x="10969898" y="20158470"/>
+            <a:ext cx="10002646" cy="10002646"/>
           </a:xfrm>
           <a:prstGeom prst="rect">
             <a:avLst/>
           </a:prstGeom>
           <a:ln>
             <a:solidFill>
-              <a:schemeClr val="bg2">
-                <a:lumMod val="90000"/>
+              <a:schemeClr val="tx1">
+                <a:lumMod val="50000"/>
+                <a:lumOff val="50000"/>
               </a:schemeClr>
             </a:solidFill>
           </a:ln>

</xml_diff>